<commit_message>
mimic nlp assignment ppt updated
</commit_message>
<xml_diff>
--- a/assignment-3/mimic_nlp_assignment.pptx
+++ b/assignment-3/mimic_nlp_assignment.pptx
@@ -2267,7 +2267,7 @@
           <a:p>
             <a:fld id="{5BCAD085-E8A6-8845-BD4E-CB4CCA059FC4}" type="datetimeFigureOut">
               <a:rPr lang="en-US" smtClean="0"/>
-              <a:t>2/12/25</a:t>
+              <a:t>2/14/25</a:t>
             </a:fld>
             <a:endParaRPr lang="en-US"/>
           </a:p>
@@ -2435,7 +2435,7 @@
           <a:p>
             <a:fld id="{5BCAD085-E8A6-8845-BD4E-CB4CCA059FC4}" type="datetimeFigureOut">
               <a:rPr lang="en-US" smtClean="0"/>
-              <a:t>2/12/25</a:t>
+              <a:t>2/14/25</a:t>
             </a:fld>
             <a:endParaRPr lang="en-US"/>
           </a:p>
@@ -2613,7 +2613,7 @@
           <a:p>
             <a:fld id="{5BCAD085-E8A6-8845-BD4E-CB4CCA059FC4}" type="datetimeFigureOut">
               <a:rPr lang="en-US" smtClean="0"/>
-              <a:t>2/12/25</a:t>
+              <a:t>2/14/25</a:t>
             </a:fld>
             <a:endParaRPr lang="en-US"/>
           </a:p>
@@ -2781,7 +2781,7 @@
           <a:p>
             <a:fld id="{5BCAD085-E8A6-8845-BD4E-CB4CCA059FC4}" type="datetimeFigureOut">
               <a:rPr lang="en-US" smtClean="0"/>
-              <a:t>2/12/25</a:t>
+              <a:t>2/14/25</a:t>
             </a:fld>
             <a:endParaRPr lang="en-US"/>
           </a:p>
@@ -3026,7 +3026,7 @@
           <a:p>
             <a:fld id="{5BCAD085-E8A6-8845-BD4E-CB4CCA059FC4}" type="datetimeFigureOut">
               <a:rPr lang="en-US" smtClean="0"/>
-              <a:t>2/12/25</a:t>
+              <a:t>2/14/25</a:t>
             </a:fld>
             <a:endParaRPr lang="en-US"/>
           </a:p>
@@ -3311,7 +3311,7 @@
           <a:p>
             <a:fld id="{5BCAD085-E8A6-8845-BD4E-CB4CCA059FC4}" type="datetimeFigureOut">
               <a:rPr lang="en-US" smtClean="0"/>
-              <a:t>2/12/25</a:t>
+              <a:t>2/14/25</a:t>
             </a:fld>
             <a:endParaRPr lang="en-US"/>
           </a:p>
@@ -3730,7 +3730,7 @@
           <a:p>
             <a:fld id="{5BCAD085-E8A6-8845-BD4E-CB4CCA059FC4}" type="datetimeFigureOut">
               <a:rPr lang="en-US" smtClean="0"/>
-              <a:t>2/12/25</a:t>
+              <a:t>2/14/25</a:t>
             </a:fld>
             <a:endParaRPr lang="en-US"/>
           </a:p>
@@ -3847,7 +3847,7 @@
           <a:p>
             <a:fld id="{5BCAD085-E8A6-8845-BD4E-CB4CCA059FC4}" type="datetimeFigureOut">
               <a:rPr lang="en-US" smtClean="0"/>
-              <a:t>2/12/25</a:t>
+              <a:t>2/14/25</a:t>
             </a:fld>
             <a:endParaRPr lang="en-US"/>
           </a:p>
@@ -3942,7 +3942,7 @@
           <a:p>
             <a:fld id="{5BCAD085-E8A6-8845-BD4E-CB4CCA059FC4}" type="datetimeFigureOut">
               <a:rPr lang="en-US" smtClean="0"/>
-              <a:t>2/12/25</a:t>
+              <a:t>2/14/25</a:t>
             </a:fld>
             <a:endParaRPr lang="en-US"/>
           </a:p>
@@ -4217,7 +4217,7 @@
           <a:p>
             <a:fld id="{5BCAD085-E8A6-8845-BD4E-CB4CCA059FC4}" type="datetimeFigureOut">
               <a:rPr lang="en-US" smtClean="0"/>
-              <a:t>2/12/25</a:t>
+              <a:t>2/14/25</a:t>
             </a:fld>
             <a:endParaRPr lang="en-US"/>
           </a:p>
@@ -4469,7 +4469,7 @@
           <a:p>
             <a:fld id="{5BCAD085-E8A6-8845-BD4E-CB4CCA059FC4}" type="datetimeFigureOut">
               <a:rPr lang="en-US" smtClean="0"/>
-              <a:t>2/12/25</a:t>
+              <a:t>2/14/25</a:t>
             </a:fld>
             <a:endParaRPr lang="en-US"/>
           </a:p>
@@ -4680,7 +4680,7 @@
           <a:p>
             <a:fld id="{5BCAD085-E8A6-8845-BD4E-CB4CCA059FC4}" type="datetimeFigureOut">
               <a:rPr lang="en-US" smtClean="0"/>
-              <a:t>2/12/25</a:t>
+              <a:t>2/14/25</a:t>
             </a:fld>
             <a:endParaRPr lang="en-US"/>
           </a:p>
@@ -7396,23 +7396,23 @@
               <a:buNone/>
             </a:pPr>
             <a:r>
-              <a:rPr lang="en-US" sz="1200" dirty="0"/>
+              <a:rPr lang="en-US" sz="1400" dirty="0"/>
               <a:t>The analysis of clinical text data is a critical task in healthcare, as it enables the extraction of meaningful insights from unstructured medical notes. In this study, we leveraged several pre-trained models and natural language processing (NLP) techniques to process and analyze ECG (echocardiography) notes from the MIMIC-III database. The goal was to identify and extract named entities, build a corpus of relevant terms, and visualize the semantic relationships between these terms. To achieve this, we utilized a combination of NLP libraries, including </a:t>
             </a:r>
             <a:r>
-              <a:rPr lang="en-US" sz="1200" dirty="0" err="1"/>
+              <a:rPr lang="en-US" sz="1400" dirty="0" err="1"/>
               <a:t>SpaCy</a:t>
             </a:r>
             <a:r>
-              <a:rPr lang="en-US" sz="1200" dirty="0"/>
+              <a:rPr lang="en-US" sz="1400" dirty="0"/>
               <a:t> and </a:t>
             </a:r>
             <a:r>
-              <a:rPr lang="en-US" sz="1200" dirty="0" err="1"/>
+              <a:rPr lang="en-US" sz="1400" dirty="0" err="1"/>
               <a:t>SciSpacy</a:t>
             </a:r>
             <a:r>
-              <a:rPr lang="en-US" sz="1200" dirty="0"/>
+              <a:rPr lang="en-US" sz="1400" dirty="0"/>
               <a:t>, for named entity recognition (NER). These libraries were chosen for their ability to handle domain-specific terminology and their pre-trained models tailored for biomedical and clinical text. By applying these tools, we built a corpus of entities extracted from the notes, which served as the foundation for further analysis.</a:t>
             </a:r>
           </a:p>
@@ -7420,22 +7420,22 @@
             <a:pPr marL="0" indent="0">
               <a:buNone/>
             </a:pPr>
-            <a:endParaRPr lang="en-US" sz="1200" dirty="0"/>
-          </a:p>
-          <a:p>
-            <a:pPr marL="0" indent="0">
-              <a:buNone/>
-            </a:pPr>
-            <a:r>
-              <a:rPr lang="en-US" sz="1200" dirty="0"/>
+            <a:endParaRPr lang="en-US" sz="1400" dirty="0"/>
+          </a:p>
+          <a:p>
+            <a:pPr marL="0" indent="0">
+              <a:buNone/>
+            </a:pPr>
+            <a:r>
+              <a:rPr lang="en-US" sz="1400" dirty="0"/>
               <a:t>In addition to NER, we explored word embedding techniques to capture the semantic relationships between terms in the clinical notes. We employed Word2Vec, a widely used model for generating word embeddings, and the </a:t>
             </a:r>
             <a:r>
-              <a:rPr lang="en-US" sz="1200" dirty="0" err="1"/>
+              <a:rPr lang="en-US" sz="1400" dirty="0" err="1"/>
               <a:t>GloVe</a:t>
             </a:r>
             <a:r>
-              <a:rPr lang="en-US" sz="1200" dirty="0"/>
+              <a:rPr lang="en-US" sz="1400" dirty="0"/>
               <a:t> pre-trained model (glove-wiki-gigaword-50) to represent words in a continuous vector space. These embeddings were then visualized using t-SNE (t-Distributed Stochastic Neighbor Embedding), a dimensionality reduction technique that projects high-dimensional data into a 2D or 3D space for easier interpretation. The t-SNE plots provided insights into the clustering and relationships between medical terms, highlighting patterns that could be useful for clinical decision-making.</a:t>
             </a:r>
           </a:p>
@@ -7443,38 +7443,38 @@
             <a:pPr marL="0" indent="0">
               <a:buNone/>
             </a:pPr>
-            <a:endParaRPr lang="en-US" sz="1200" dirty="0"/>
-          </a:p>
-          <a:p>
-            <a:pPr marL="0" indent="0">
-              <a:buNone/>
-            </a:pPr>
-            <a:r>
-              <a:rPr lang="en-US" sz="1200" dirty="0"/>
+            <a:endParaRPr lang="en-US" sz="1400" dirty="0"/>
+          </a:p>
+          <a:p>
+            <a:pPr marL="0" indent="0">
+              <a:buNone/>
+            </a:pPr>
+            <a:r>
+              <a:rPr lang="en-US" sz="1400" dirty="0"/>
               <a:t>Finally, we incorporated </a:t>
             </a:r>
             <a:r>
-              <a:rPr lang="en-US" sz="1200" dirty="0" err="1"/>
+              <a:rPr lang="en-US" sz="1400" dirty="0" err="1"/>
               <a:t>ClinicalBERT</a:t>
             </a:r>
             <a:r>
-              <a:rPr lang="en-US" sz="1200" dirty="0"/>
+              <a:rPr lang="en-US" sz="1400" dirty="0"/>
               <a:t>, a pre-trained language model fine-tuned for clinical text, to further enhance our analysis. </a:t>
             </a:r>
             <a:r>
-              <a:rPr lang="en-US" sz="1200" dirty="0" err="1"/>
+              <a:rPr lang="en-US" sz="1400" dirty="0" err="1"/>
               <a:t>ClinicalBERT</a:t>
             </a:r>
             <a:r>
-              <a:rPr lang="en-US" sz="1200" dirty="0"/>
+              <a:rPr lang="en-US" sz="1400" dirty="0"/>
               <a:t> was used to generate contextual embeddings for the echocardiography notes, capturing the nuanced meaning of medical terms within their clinical context. These embeddings were also visualized using t-SNE, allowing us to compare the results with those obtained from Word2Vec and </a:t>
             </a:r>
             <a:r>
-              <a:rPr lang="en-US" sz="1200" dirty="0" err="1"/>
+              <a:rPr lang="en-US" sz="1400" dirty="0" err="1"/>
               <a:t>GloVe</a:t>
             </a:r>
             <a:r>
-              <a:rPr lang="en-US" sz="1200" dirty="0"/>
+              <a:rPr lang="en-US" sz="1400" dirty="0"/>
               <a:t>. By combining these approaches, we aimed to create a comprehensive pipeline for analyzing clinical text data, from entity extraction and corpus building to semantic visualization and contextual understanding. This multi-faceted approach demonstrates the potential of advanced NLP techniques in transforming unstructured clinical notes into actionable insights for healthcare applications.</a:t>
             </a:r>
           </a:p>

</xml_diff>